<commit_message>
Added Oil Production Slide
</commit_message>
<xml_diff>
--- a/Longhorn_Energy_Club_Presentation.pptx
+++ b/Longhorn_Energy_Club_Presentation.pptx
@@ -1787,17 +1787,17 @@
           <a:noFill/>
           <a:extLst>
             <a:ext uri="{FAA26D3D-D897-4be2-8F04-BA451C77F1D7}">
-              <ma14:placeholderFlag xmlns:ma14="http://schemas.microsoft.com/office/mac/drawingml/2011/main" xmlns="" val="1"/>
+              <ma14:placeholderFlag xmlns="" xmlns:ma14="http://schemas.microsoft.com/office/mac/drawingml/2011/main" val="1"/>
             </a:ext>
             <a:ext uri="{909E8E84-426E-40dd-AFC4-6F175D3DCCD1}">
-              <a14:hiddenFill xmlns="" xmlns:a14="http://schemas.microsoft.com/office/drawing/2010/main">
+              <a14:hiddenFill xmlns:a14="http://schemas.microsoft.com/office/drawing/2010/main" xmlns="">
                 <a:solidFill>
                   <a:srgbClr val="FFFFFF"/>
                 </a:solidFill>
               </a14:hiddenFill>
             </a:ext>
             <a:ext uri="{91240B29-F687-4f45-9708-019B960494DF}">
-              <a14:hiddenLine xmlns="" xmlns:a14="http://schemas.microsoft.com/office/drawing/2010/main" w="9525">
+              <a14:hiddenLine xmlns:a14="http://schemas.microsoft.com/office/drawing/2010/main" xmlns="" w="9525">
                 <a:solidFill>
                   <a:srgbClr val="000000"/>
                 </a:solidFill>
@@ -1939,17 +1939,17 @@
           <a:noFill/>
           <a:extLst>
             <a:ext uri="{FAA26D3D-D897-4be2-8F04-BA451C77F1D7}">
-              <ma14:placeholderFlag xmlns:ma14="http://schemas.microsoft.com/office/mac/drawingml/2011/main" xmlns="" val="1"/>
+              <ma14:placeholderFlag xmlns="" xmlns:ma14="http://schemas.microsoft.com/office/mac/drawingml/2011/main" val="1"/>
             </a:ext>
             <a:ext uri="{909E8E84-426E-40dd-AFC4-6F175D3DCCD1}">
-              <a14:hiddenFill xmlns="" xmlns:a14="http://schemas.microsoft.com/office/drawing/2010/main">
+              <a14:hiddenFill xmlns:a14="http://schemas.microsoft.com/office/drawing/2010/main" xmlns="">
                 <a:solidFill>
                   <a:srgbClr val="FFFFFF"/>
                 </a:solidFill>
               </a14:hiddenFill>
             </a:ext>
             <a:ext uri="{91240B29-F687-4f45-9708-019B960494DF}">
-              <a14:hiddenLine xmlns="" xmlns:a14="http://schemas.microsoft.com/office/drawing/2010/main" w="9525">
+              <a14:hiddenLine xmlns:a14="http://schemas.microsoft.com/office/drawing/2010/main" xmlns="" w="9525">
                 <a:solidFill>
                   <a:srgbClr val="000000"/>
                 </a:solidFill>
@@ -2090,17 +2090,17 @@
           <a:noFill/>
           <a:extLst>
             <a:ext uri="{FAA26D3D-D897-4be2-8F04-BA451C77F1D7}">
-              <ma14:placeholderFlag xmlns:ma14="http://schemas.microsoft.com/office/mac/drawingml/2011/main" xmlns="" val="1"/>
+              <ma14:placeholderFlag xmlns="" xmlns:ma14="http://schemas.microsoft.com/office/mac/drawingml/2011/main" val="1"/>
             </a:ext>
             <a:ext uri="{909E8E84-426E-40dd-AFC4-6F175D3DCCD1}">
-              <a14:hiddenFill xmlns="" xmlns:a14="http://schemas.microsoft.com/office/drawing/2010/main">
+              <a14:hiddenFill xmlns:a14="http://schemas.microsoft.com/office/drawing/2010/main" xmlns="">
                 <a:solidFill>
                   <a:srgbClr val="FFFFFF"/>
                 </a:solidFill>
               </a14:hiddenFill>
             </a:ext>
             <a:ext uri="{91240B29-F687-4f45-9708-019B960494DF}">
-              <a14:hiddenLine xmlns="" xmlns:a14="http://schemas.microsoft.com/office/drawing/2010/main" w="9525">
+              <a14:hiddenLine xmlns:a14="http://schemas.microsoft.com/office/drawing/2010/main" xmlns="" w="9525">
                 <a:solidFill>
                   <a:srgbClr val="000000"/>
                 </a:solidFill>
@@ -2379,14 +2379,14 @@
           </a:ln>
           <a:extLst>
             <a:ext uri="{909E8E84-426E-40dd-AFC4-6F175D3DCCD1}">
-              <a14:hiddenFill xmlns="" xmlns:a14="http://schemas.microsoft.com/office/drawing/2010/main">
+              <a14:hiddenFill xmlns:a14="http://schemas.microsoft.com/office/drawing/2010/main" xmlns="">
                 <a:solidFill>
                   <a:srgbClr val="FFFFFF"/>
                 </a:solidFill>
               </a14:hiddenFill>
             </a:ext>
             <a:ext uri="{91240B29-F687-4f45-9708-019B960494DF}">
-              <a14:hiddenLine xmlns="" xmlns:a14="http://schemas.microsoft.com/office/drawing/2010/main" w="9525">
+              <a14:hiddenLine xmlns:a14="http://schemas.microsoft.com/office/drawing/2010/main" xmlns="" w="9525">
                 <a:solidFill>
                   <a:srgbClr val="000000"/>
                 </a:solidFill>
@@ -2449,17 +2449,17 @@
           <a:noFill/>
           <a:extLst>
             <a:ext uri="{FAA26D3D-D897-4be2-8F04-BA451C77F1D7}">
-              <ma14:placeholderFlag xmlns:ma14="http://schemas.microsoft.com/office/mac/drawingml/2011/main" xmlns="" val="1"/>
+              <ma14:placeholderFlag xmlns="" xmlns:ma14="http://schemas.microsoft.com/office/mac/drawingml/2011/main" val="1"/>
             </a:ext>
             <a:ext uri="{909E8E84-426E-40dd-AFC4-6F175D3DCCD1}">
-              <a14:hiddenFill xmlns="" xmlns:a14="http://schemas.microsoft.com/office/drawing/2010/main">
+              <a14:hiddenFill xmlns:a14="http://schemas.microsoft.com/office/drawing/2010/main" xmlns="">
                 <a:solidFill>
                   <a:srgbClr val="FFFFFF"/>
                 </a:solidFill>
               </a14:hiddenFill>
             </a:ext>
             <a:ext uri="{91240B29-F687-4f45-9708-019B960494DF}">
-              <a14:hiddenLine xmlns="" xmlns:a14="http://schemas.microsoft.com/office/drawing/2010/main" w="9525">
+              <a14:hiddenLine xmlns:a14="http://schemas.microsoft.com/office/drawing/2010/main" xmlns="" w="9525">
                 <a:solidFill>
                   <a:srgbClr val="000000"/>
                 </a:solidFill>
@@ -2600,17 +2600,17 @@
           <a:noFill/>
           <a:extLst>
             <a:ext uri="{FAA26D3D-D897-4be2-8F04-BA451C77F1D7}">
-              <ma14:placeholderFlag xmlns:ma14="http://schemas.microsoft.com/office/mac/drawingml/2011/main" xmlns="" val="1"/>
+              <ma14:placeholderFlag xmlns="" xmlns:ma14="http://schemas.microsoft.com/office/mac/drawingml/2011/main" val="1"/>
             </a:ext>
             <a:ext uri="{909E8E84-426E-40dd-AFC4-6F175D3DCCD1}">
-              <a14:hiddenFill xmlns="" xmlns:a14="http://schemas.microsoft.com/office/drawing/2010/main">
+              <a14:hiddenFill xmlns:a14="http://schemas.microsoft.com/office/drawing/2010/main" xmlns="">
                 <a:solidFill>
                   <a:srgbClr val="FFFFFF"/>
                 </a:solidFill>
               </a14:hiddenFill>
             </a:ext>
             <a:ext uri="{91240B29-F687-4f45-9708-019B960494DF}">
-              <a14:hiddenLine xmlns="" xmlns:a14="http://schemas.microsoft.com/office/drawing/2010/main" w="9525">
+              <a14:hiddenLine xmlns:a14="http://schemas.microsoft.com/office/drawing/2010/main" xmlns="" w="9525">
                 <a:solidFill>
                   <a:srgbClr val="000000"/>
                 </a:solidFill>
@@ -2782,17 +2782,17 @@
           <a:noFill/>
           <a:extLst>
             <a:ext uri="{FAA26D3D-D897-4be2-8F04-BA451C77F1D7}">
-              <ma14:placeholderFlag xmlns:ma14="http://schemas.microsoft.com/office/mac/drawingml/2011/main" xmlns="" val="1"/>
+              <ma14:placeholderFlag xmlns="" xmlns:ma14="http://schemas.microsoft.com/office/mac/drawingml/2011/main" val="1"/>
             </a:ext>
             <a:ext uri="{909E8E84-426E-40dd-AFC4-6F175D3DCCD1}">
-              <a14:hiddenFill xmlns="" xmlns:a14="http://schemas.microsoft.com/office/drawing/2010/main">
+              <a14:hiddenFill xmlns:a14="http://schemas.microsoft.com/office/drawing/2010/main" xmlns="">
                 <a:solidFill>
                   <a:srgbClr val="FFFFFF"/>
                 </a:solidFill>
               </a14:hiddenFill>
             </a:ext>
             <a:ext uri="{91240B29-F687-4f45-9708-019B960494DF}">
-              <a14:hiddenLine xmlns="" xmlns:a14="http://schemas.microsoft.com/office/drawing/2010/main" w="9525">
+              <a14:hiddenLine xmlns:a14="http://schemas.microsoft.com/office/drawing/2010/main" xmlns="" w="9525">
                 <a:solidFill>
                   <a:srgbClr val="000000"/>
                 </a:solidFill>
@@ -4884,6 +4884,364 @@
               <a:latin typeface="+mn-lt"/>
               <a:cs typeface="Arial" panose="020B0604020202020204" pitchFamily="34" charset="0"/>
             </a:endParaRPr>
+          </a:p>
+        </p:txBody>
+      </p:sp>
+      <p:pic>
+        <p:nvPicPr>
+          <p:cNvPr id="3" name="Picture 2" descr="Chart, scatter chart&#10;&#10;Description automatically generated">
+            <a:extLst>
+              <a:ext uri="{FF2B5EF4-FFF2-40B4-BE49-F238E27FC236}">
+                <a16:creationId xmlns:a16="http://schemas.microsoft.com/office/drawing/2014/main" id="{86AC2D89-259C-413A-B452-34E7C841E8F4}"/>
+              </a:ext>
+            </a:extLst>
+          </p:cNvPr>
+          <p:cNvPicPr>
+            <a:picLocks noChangeAspect="1"/>
+          </p:cNvPicPr>
+          <p:nvPr/>
+        </p:nvPicPr>
+        <p:blipFill>
+          <a:blip r:embed="rId3"/>
+          <a:stretch>
+            <a:fillRect/>
+          </a:stretch>
+        </p:blipFill>
+        <p:spPr>
+          <a:xfrm>
+            <a:off x="111451" y="1196482"/>
+            <a:ext cx="3890279" cy="2474823"/>
+          </a:xfrm>
+          <a:prstGeom prst="rect">
+            <a:avLst/>
+          </a:prstGeom>
+        </p:spPr>
+      </p:pic>
+      <p:pic>
+        <p:nvPicPr>
+          <p:cNvPr id="5" name="Picture 4" descr="A picture containing text, traffic light, screenshot, vector graphics&#10;&#10;Description automatically generated">
+            <a:extLst>
+              <a:ext uri="{FF2B5EF4-FFF2-40B4-BE49-F238E27FC236}">
+                <a16:creationId xmlns:a16="http://schemas.microsoft.com/office/drawing/2014/main" id="{472B4B9E-A0BB-46F6-9E1F-70A7539C756B}"/>
+              </a:ext>
+            </a:extLst>
+          </p:cNvPr>
+          <p:cNvPicPr>
+            <a:picLocks noChangeAspect="1"/>
+          </p:cNvPicPr>
+          <p:nvPr/>
+        </p:nvPicPr>
+        <p:blipFill>
+          <a:blip r:embed="rId4"/>
+          <a:stretch>
+            <a:fillRect/>
+          </a:stretch>
+        </p:blipFill>
+        <p:spPr>
+          <a:xfrm>
+            <a:off x="111452" y="4136534"/>
+            <a:ext cx="3654303" cy="2489942"/>
+          </a:xfrm>
+          <a:prstGeom prst="rect">
+            <a:avLst/>
+          </a:prstGeom>
+        </p:spPr>
+      </p:pic>
+      <p:grpSp>
+        <p:nvGrpSpPr>
+          <p:cNvPr id="10" name="Group 9">
+            <a:extLst>
+              <a:ext uri="{FF2B5EF4-FFF2-40B4-BE49-F238E27FC236}">
+                <a16:creationId xmlns:a16="http://schemas.microsoft.com/office/drawing/2014/main" id="{5EE0C604-1C50-472A-8323-128D86FD2684}"/>
+              </a:ext>
+            </a:extLst>
+          </p:cNvPr>
+          <p:cNvGrpSpPr/>
+          <p:nvPr/>
+        </p:nvGrpSpPr>
+        <p:grpSpPr>
+          <a:xfrm>
+            <a:off x="506026" y="3718279"/>
+            <a:ext cx="1617742" cy="338554"/>
+            <a:chOff x="506026" y="3718279"/>
+            <a:chExt cx="1617742" cy="338554"/>
+          </a:xfrm>
+        </p:grpSpPr>
+        <p:sp>
+          <p:nvSpPr>
+            <p:cNvPr id="6" name="Oval 5">
+              <a:extLst>
+                <a:ext uri="{FF2B5EF4-FFF2-40B4-BE49-F238E27FC236}">
+                  <a16:creationId xmlns:a16="http://schemas.microsoft.com/office/drawing/2014/main" id="{30C7E1D8-6F4B-472F-ABF4-4756A9555099}"/>
+                </a:ext>
+              </a:extLst>
+            </p:cNvPr>
+            <p:cNvSpPr/>
+            <p:nvPr/>
+          </p:nvSpPr>
+          <p:spPr>
+            <a:xfrm>
+              <a:off x="506026" y="3765255"/>
+              <a:ext cx="254513" cy="244603"/>
+            </a:xfrm>
+            <a:prstGeom prst="ellipse">
+              <a:avLst/>
+            </a:prstGeom>
+            <a:solidFill>
+              <a:srgbClr val="C00000"/>
+            </a:solidFill>
+            <a:ln>
+              <a:noFill/>
+            </a:ln>
+          </p:spPr>
+          <p:style>
+            <a:lnRef idx="1">
+              <a:schemeClr val="accent1"/>
+            </a:lnRef>
+            <a:fillRef idx="3">
+              <a:schemeClr val="accent1"/>
+            </a:fillRef>
+            <a:effectRef idx="2">
+              <a:schemeClr val="accent1"/>
+            </a:effectRef>
+            <a:fontRef idx="minor">
+              <a:schemeClr val="lt1"/>
+            </a:fontRef>
+          </p:style>
+          <p:txBody>
+            <a:bodyPr rtlCol="0" anchor="ctr"/>
+            <a:lstStyle/>
+            <a:p>
+              <a:pPr algn="ctr"/>
+              <a:endParaRPr lang="en-US"/>
+            </a:p>
+          </p:txBody>
+        </p:sp>
+        <p:sp>
+          <p:nvSpPr>
+            <p:cNvPr id="7" name="TextBox 6">
+              <a:extLst>
+                <a:ext uri="{FF2B5EF4-FFF2-40B4-BE49-F238E27FC236}">
+                  <a16:creationId xmlns:a16="http://schemas.microsoft.com/office/drawing/2014/main" id="{BB66CC7D-C8D9-4037-B5B1-B65C9F38C379}"/>
+                </a:ext>
+              </a:extLst>
+            </p:cNvPr>
+            <p:cNvSpPr txBox="1"/>
+            <p:nvPr/>
+          </p:nvSpPr>
+          <p:spPr>
+            <a:xfrm>
+              <a:off x="760539" y="3718279"/>
+              <a:ext cx="1363229" cy="338554"/>
+            </a:xfrm>
+            <a:prstGeom prst="rect">
+              <a:avLst/>
+            </a:prstGeom>
+            <a:noFill/>
+          </p:spPr>
+          <p:txBody>
+            <a:bodyPr wrap="square" rtlCol="0">
+              <a:spAutoFit/>
+            </a:bodyPr>
+            <a:lstStyle/>
+            <a:p>
+              <a:r>
+                <a:rPr lang="en-US" sz="1600" dirty="0"/>
+                <a:t>= Upper Zone</a:t>
+              </a:r>
+            </a:p>
+          </p:txBody>
+        </p:sp>
+      </p:grpSp>
+      <p:grpSp>
+        <p:nvGrpSpPr>
+          <p:cNvPr id="12" name="Group 11">
+            <a:extLst>
+              <a:ext uri="{FF2B5EF4-FFF2-40B4-BE49-F238E27FC236}">
+                <a16:creationId xmlns:a16="http://schemas.microsoft.com/office/drawing/2014/main" id="{1605B187-9DAE-433E-B80F-5FD1F3DF4AF7}"/>
+              </a:ext>
+            </a:extLst>
+          </p:cNvPr>
+          <p:cNvGrpSpPr/>
+          <p:nvPr/>
+        </p:nvGrpSpPr>
+        <p:grpSpPr>
+          <a:xfrm>
+            <a:off x="2329346" y="3718279"/>
+            <a:ext cx="1598640" cy="338554"/>
+            <a:chOff x="2329346" y="3718279"/>
+            <a:chExt cx="1598640" cy="338554"/>
+          </a:xfrm>
+        </p:grpSpPr>
+        <p:sp>
+          <p:nvSpPr>
+            <p:cNvPr id="8" name="Oval 7">
+              <a:extLst>
+                <a:ext uri="{FF2B5EF4-FFF2-40B4-BE49-F238E27FC236}">
+                  <a16:creationId xmlns:a16="http://schemas.microsoft.com/office/drawing/2014/main" id="{87483198-5014-4F8C-92B3-C671DECEDF8B}"/>
+                </a:ext>
+              </a:extLst>
+            </p:cNvPr>
+            <p:cNvSpPr/>
+            <p:nvPr/>
+          </p:nvSpPr>
+          <p:spPr>
+            <a:xfrm>
+              <a:off x="2329346" y="3765254"/>
+              <a:ext cx="254513" cy="244603"/>
+            </a:xfrm>
+            <a:prstGeom prst="ellipse">
+              <a:avLst/>
+            </a:prstGeom>
+            <a:solidFill>
+              <a:schemeClr val="tx1"/>
+            </a:solidFill>
+            <a:ln>
+              <a:noFill/>
+            </a:ln>
+          </p:spPr>
+          <p:style>
+            <a:lnRef idx="1">
+              <a:schemeClr val="accent1"/>
+            </a:lnRef>
+            <a:fillRef idx="3">
+              <a:schemeClr val="accent1"/>
+            </a:fillRef>
+            <a:effectRef idx="2">
+              <a:schemeClr val="accent1"/>
+            </a:effectRef>
+            <a:fontRef idx="minor">
+              <a:schemeClr val="lt1"/>
+            </a:fontRef>
+          </p:style>
+          <p:txBody>
+            <a:bodyPr rtlCol="0" anchor="ctr"/>
+            <a:lstStyle/>
+            <a:p>
+              <a:pPr algn="ctr"/>
+              <a:endParaRPr lang="en-US"/>
+            </a:p>
+          </p:txBody>
+        </p:sp>
+        <p:sp>
+          <p:nvSpPr>
+            <p:cNvPr id="11" name="TextBox 10">
+              <a:extLst>
+                <a:ext uri="{FF2B5EF4-FFF2-40B4-BE49-F238E27FC236}">
+                  <a16:creationId xmlns:a16="http://schemas.microsoft.com/office/drawing/2014/main" id="{42555567-6CDD-4D1B-A83E-2069BDA88269}"/>
+                </a:ext>
+              </a:extLst>
+            </p:cNvPr>
+            <p:cNvSpPr txBox="1"/>
+            <p:nvPr/>
+          </p:nvSpPr>
+          <p:spPr>
+            <a:xfrm>
+              <a:off x="2564757" y="3718279"/>
+              <a:ext cx="1363229" cy="338554"/>
+            </a:xfrm>
+            <a:prstGeom prst="rect">
+              <a:avLst/>
+            </a:prstGeom>
+            <a:noFill/>
+          </p:spPr>
+          <p:txBody>
+            <a:bodyPr wrap="square" rtlCol="0">
+              <a:spAutoFit/>
+            </a:bodyPr>
+            <a:lstStyle/>
+            <a:p>
+              <a:r>
+                <a:rPr lang="en-US" sz="1600" dirty="0"/>
+                <a:t>= Lower Zone</a:t>
+              </a:r>
+            </a:p>
+          </p:txBody>
+        </p:sp>
+      </p:grpSp>
+      <p:sp>
+        <p:nvSpPr>
+          <p:cNvPr id="13" name="TextBox 12">
+            <a:extLst>
+              <a:ext uri="{FF2B5EF4-FFF2-40B4-BE49-F238E27FC236}">
+                <a16:creationId xmlns:a16="http://schemas.microsoft.com/office/drawing/2014/main" id="{2F3F94A3-E4EC-4649-BFF7-1CEF3710387F}"/>
+              </a:ext>
+            </a:extLst>
+          </p:cNvPr>
+          <p:cNvSpPr txBox="1"/>
+          <p:nvPr/>
+        </p:nvSpPr>
+        <p:spPr>
+          <a:xfrm>
+            <a:off x="4368975" y="1606931"/>
+            <a:ext cx="4300761" cy="4524315"/>
+          </a:xfrm>
+          <a:prstGeom prst="rect">
+            <a:avLst/>
+          </a:prstGeom>
+          <a:noFill/>
+        </p:spPr>
+        <p:txBody>
+          <a:bodyPr wrap="square" rtlCol="0">
+            <a:spAutoFit/>
+          </a:bodyPr>
+          <a:lstStyle/>
+          <a:p>
+            <a:pPr marL="342900" indent="-342900">
+              <a:buFont typeface="Arial" panose="020B0604020202020204" pitchFamily="34" charset="0"/>
+              <a:buChar char="•"/>
+            </a:pPr>
+            <a:r>
+              <a:rPr lang="en-US" dirty="0"/>
+              <a:t>Lower Zone generally has much greater production</a:t>
+            </a:r>
+          </a:p>
+          <a:p>
+            <a:pPr marL="800100" lvl="1" indent="-342900">
+              <a:buFont typeface="Arial" panose="020B0604020202020204" pitchFamily="34" charset="0"/>
+              <a:buChar char="•"/>
+            </a:pPr>
+            <a:r>
+              <a:rPr lang="en-US" dirty="0"/>
+              <a:t>True for monthly and total production</a:t>
+            </a:r>
+          </a:p>
+          <a:p>
+            <a:endParaRPr lang="en-US" dirty="0"/>
+          </a:p>
+          <a:p>
+            <a:pPr marL="342900" indent="-342900">
+              <a:buFont typeface="Arial" panose="020B0604020202020204" pitchFamily="34" charset="0"/>
+              <a:buChar char="•"/>
+            </a:pPr>
+            <a:r>
+              <a:rPr lang="en-US" dirty="0"/>
+              <a:t>Bottom right area has more production</a:t>
+            </a:r>
+          </a:p>
+          <a:p>
+            <a:pPr marL="800100" lvl="1" indent="-342900">
+              <a:buFont typeface="Arial" panose="020B0604020202020204" pitchFamily="34" charset="0"/>
+              <a:buChar char="•"/>
+            </a:pPr>
+            <a:r>
+              <a:rPr lang="en-US" dirty="0"/>
+              <a:t>True for monthly and total production</a:t>
+            </a:r>
+          </a:p>
+          <a:p>
+            <a:pPr lvl="1"/>
+            <a:endParaRPr lang="en-US" dirty="0"/>
+          </a:p>
+          <a:p>
+            <a:pPr marL="342900" indent="-342900">
+              <a:buFont typeface="Arial" panose="020B0604020202020204" pitchFamily="34" charset="0"/>
+              <a:buChar char="•"/>
+            </a:pPr>
+            <a:r>
+              <a:rPr lang="en-US" dirty="0"/>
+              <a:t>Bottom right area appears to be more used</a:t>
+            </a:r>
           </a:p>
         </p:txBody>
       </p:sp>

</xml_diff>

<commit_message>
Almost done with Presentation
</commit_message>
<xml_diff>
--- a/Longhorn_Energy_Club_Presentation.pptx
+++ b/Longhorn_Energy_Club_Presentation.pptx
@@ -646,84 +646,6 @@
           <a:bodyPr/>
           <a:lstStyle/>
           <a:p>
-            <a:pPr algn="ctr"/>
-            <a:r>
-              <a:rPr lang="en-US" sz="1200" b="1" dirty="0">
-                <a:latin typeface="+mn-lt"/>
-                <a:cs typeface="Arial" panose="020B0604020202020204" pitchFamily="34" charset="0"/>
-              </a:rPr>
-              <a:t>Showcase Interesting and Innovative Aspects of Your Workflow.</a:t>
-            </a:r>
-          </a:p>
-          <a:p>
-            <a:pPr algn="ctr"/>
-            <a:endParaRPr lang="en-US" sz="1200" b="1" dirty="0">
-              <a:latin typeface="+mn-lt"/>
-              <a:cs typeface="Arial" panose="020B0604020202020204" pitchFamily="34" charset="0"/>
-            </a:endParaRPr>
-          </a:p>
-          <a:p>
-            <a:pPr algn="ctr"/>
-            <a:r>
-              <a:rPr lang="en-US" sz="1200" b="1" dirty="0">
-                <a:latin typeface="+mn-lt"/>
-                <a:cs typeface="Arial" panose="020B0604020202020204" pitchFamily="34" charset="0"/>
-              </a:rPr>
-              <a:t>State and Defend Modeling Decisions</a:t>
-            </a:r>
-          </a:p>
-          <a:p>
-            <a:pPr algn="ctr"/>
-            <a:endParaRPr lang="en-US" sz="1200" b="1" dirty="0">
-              <a:latin typeface="+mn-lt"/>
-              <a:cs typeface="Arial" panose="020B0604020202020204" pitchFamily="34" charset="0"/>
-            </a:endParaRPr>
-          </a:p>
-          <a:p>
-            <a:pPr algn="ctr"/>
-            <a:r>
-              <a:rPr lang="en-US" sz="1200" b="1" dirty="0">
-                <a:latin typeface="+mn-lt"/>
-                <a:cs typeface="Arial" panose="020B0604020202020204" pitchFamily="34" charset="0"/>
-              </a:rPr>
-              <a:t>Discuss Critical Results and Learnings for Workflow Steps</a:t>
-            </a:r>
-          </a:p>
-          <a:p>
-            <a:pPr algn="ctr"/>
-            <a:endParaRPr lang="en-US" sz="1200" b="1" dirty="0">
-              <a:latin typeface="+mn-lt"/>
-              <a:cs typeface="Arial" panose="020B0604020202020204" pitchFamily="34" charset="0"/>
-            </a:endParaRPr>
-          </a:p>
-          <a:p>
-            <a:pPr algn="ctr"/>
-            <a:r>
-              <a:rPr lang="en-US" sz="1200" b="1" dirty="0">
-                <a:latin typeface="+mn-lt"/>
-                <a:cs typeface="Arial" panose="020B0604020202020204" pitchFamily="34" charset="0"/>
-              </a:rPr>
-              <a:t>Captions for all Figures</a:t>
-            </a:r>
-          </a:p>
-          <a:p>
-            <a:pPr algn="ctr"/>
-            <a:endParaRPr lang="en-US" sz="1200" b="1" dirty="0">
-              <a:latin typeface="+mn-lt"/>
-              <a:cs typeface="Arial" panose="020B0604020202020204" pitchFamily="34" charset="0"/>
-            </a:endParaRPr>
-          </a:p>
-          <a:p>
-            <a:pPr algn="ctr"/>
-            <a:r>
-              <a:rPr lang="en-US" sz="1200" b="1" dirty="0">
-                <a:latin typeface="+mn-lt"/>
-                <a:cs typeface="Arial" panose="020B0604020202020204" pitchFamily="34" charset="0"/>
-              </a:rPr>
-              <a:t>Concise Text on Slides to Explain the Main Points</a:t>
-            </a:r>
-          </a:p>
-          <a:p>
             <a:endParaRPr lang="en-US" dirty="0"/>
           </a:p>
         </p:txBody>
@@ -808,84 +730,6 @@
           <a:bodyPr/>
           <a:lstStyle/>
           <a:p>
-            <a:pPr algn="ctr"/>
-            <a:r>
-              <a:rPr lang="en-US" sz="1200" b="1" dirty="0">
-                <a:latin typeface="+mn-lt"/>
-                <a:cs typeface="Arial" panose="020B0604020202020204" pitchFamily="34" charset="0"/>
-              </a:rPr>
-              <a:t>Showcase Interesting and Innovative Aspects of Your Workflow.</a:t>
-            </a:r>
-          </a:p>
-          <a:p>
-            <a:pPr algn="ctr"/>
-            <a:endParaRPr lang="en-US" sz="1200" b="1" dirty="0">
-              <a:latin typeface="+mn-lt"/>
-              <a:cs typeface="Arial" panose="020B0604020202020204" pitchFamily="34" charset="0"/>
-            </a:endParaRPr>
-          </a:p>
-          <a:p>
-            <a:pPr algn="ctr"/>
-            <a:r>
-              <a:rPr lang="en-US" sz="1200" b="1" dirty="0">
-                <a:latin typeface="+mn-lt"/>
-                <a:cs typeface="Arial" panose="020B0604020202020204" pitchFamily="34" charset="0"/>
-              </a:rPr>
-              <a:t>State and Defend Modeling Decisions</a:t>
-            </a:r>
-          </a:p>
-          <a:p>
-            <a:pPr algn="ctr"/>
-            <a:endParaRPr lang="en-US" sz="1200" b="1" dirty="0">
-              <a:latin typeface="+mn-lt"/>
-              <a:cs typeface="Arial" panose="020B0604020202020204" pitchFamily="34" charset="0"/>
-            </a:endParaRPr>
-          </a:p>
-          <a:p>
-            <a:pPr algn="ctr"/>
-            <a:r>
-              <a:rPr lang="en-US" sz="1200" b="1" dirty="0">
-                <a:latin typeface="+mn-lt"/>
-                <a:cs typeface="Arial" panose="020B0604020202020204" pitchFamily="34" charset="0"/>
-              </a:rPr>
-              <a:t>Discuss Critical Results and Learnings for Workflow Steps</a:t>
-            </a:r>
-          </a:p>
-          <a:p>
-            <a:pPr algn="ctr"/>
-            <a:endParaRPr lang="en-US" sz="1200" b="1" dirty="0">
-              <a:latin typeface="+mn-lt"/>
-              <a:cs typeface="Arial" panose="020B0604020202020204" pitchFamily="34" charset="0"/>
-            </a:endParaRPr>
-          </a:p>
-          <a:p>
-            <a:pPr algn="ctr"/>
-            <a:r>
-              <a:rPr lang="en-US" sz="1200" b="1" dirty="0">
-                <a:latin typeface="+mn-lt"/>
-                <a:cs typeface="Arial" panose="020B0604020202020204" pitchFamily="34" charset="0"/>
-              </a:rPr>
-              <a:t>Captions for all Figures</a:t>
-            </a:r>
-          </a:p>
-          <a:p>
-            <a:pPr algn="ctr"/>
-            <a:endParaRPr lang="en-US" sz="1200" b="1" dirty="0">
-              <a:latin typeface="+mn-lt"/>
-              <a:cs typeface="Arial" panose="020B0604020202020204" pitchFamily="34" charset="0"/>
-            </a:endParaRPr>
-          </a:p>
-          <a:p>
-            <a:pPr algn="ctr"/>
-            <a:r>
-              <a:rPr lang="en-US" sz="1200" b="1" dirty="0">
-                <a:latin typeface="+mn-lt"/>
-                <a:cs typeface="Arial" panose="020B0604020202020204" pitchFamily="34" charset="0"/>
-              </a:rPr>
-              <a:t>Concise Text on Slides to Explain the Main Points</a:t>
-            </a:r>
-          </a:p>
-          <a:p>
             <a:endParaRPr lang="en-US" dirty="0"/>
           </a:p>
         </p:txBody>
@@ -970,84 +814,6 @@
           <a:bodyPr/>
           <a:lstStyle/>
           <a:p>
-            <a:pPr algn="ctr"/>
-            <a:r>
-              <a:rPr lang="en-US" sz="1200" b="1" dirty="0">
-                <a:latin typeface="+mn-lt"/>
-                <a:cs typeface="Arial" panose="020B0604020202020204" pitchFamily="34" charset="0"/>
-              </a:rPr>
-              <a:t>Showcase Interesting and Innovative Aspects of Your Workflow.</a:t>
-            </a:r>
-          </a:p>
-          <a:p>
-            <a:pPr algn="ctr"/>
-            <a:endParaRPr lang="en-US" sz="1200" b="1" dirty="0">
-              <a:latin typeface="+mn-lt"/>
-              <a:cs typeface="Arial" panose="020B0604020202020204" pitchFamily="34" charset="0"/>
-            </a:endParaRPr>
-          </a:p>
-          <a:p>
-            <a:pPr algn="ctr"/>
-            <a:r>
-              <a:rPr lang="en-US" sz="1200" b="1" dirty="0">
-                <a:latin typeface="+mn-lt"/>
-                <a:cs typeface="Arial" panose="020B0604020202020204" pitchFamily="34" charset="0"/>
-              </a:rPr>
-              <a:t>State and Defend Modeling Decisions</a:t>
-            </a:r>
-          </a:p>
-          <a:p>
-            <a:pPr algn="ctr"/>
-            <a:endParaRPr lang="en-US" sz="1200" b="1" dirty="0">
-              <a:latin typeface="+mn-lt"/>
-              <a:cs typeface="Arial" panose="020B0604020202020204" pitchFamily="34" charset="0"/>
-            </a:endParaRPr>
-          </a:p>
-          <a:p>
-            <a:pPr algn="ctr"/>
-            <a:r>
-              <a:rPr lang="en-US" sz="1200" b="1" dirty="0">
-                <a:latin typeface="+mn-lt"/>
-                <a:cs typeface="Arial" panose="020B0604020202020204" pitchFamily="34" charset="0"/>
-              </a:rPr>
-              <a:t>Discuss Critical Results and Learnings for Workflow Steps</a:t>
-            </a:r>
-          </a:p>
-          <a:p>
-            <a:pPr algn="ctr"/>
-            <a:endParaRPr lang="en-US" sz="1200" b="1" dirty="0">
-              <a:latin typeface="+mn-lt"/>
-              <a:cs typeface="Arial" panose="020B0604020202020204" pitchFamily="34" charset="0"/>
-            </a:endParaRPr>
-          </a:p>
-          <a:p>
-            <a:pPr algn="ctr"/>
-            <a:r>
-              <a:rPr lang="en-US" sz="1200" b="1" dirty="0">
-                <a:latin typeface="+mn-lt"/>
-                <a:cs typeface="Arial" panose="020B0604020202020204" pitchFamily="34" charset="0"/>
-              </a:rPr>
-              <a:t>Captions for all Figures</a:t>
-            </a:r>
-          </a:p>
-          <a:p>
-            <a:pPr algn="ctr"/>
-            <a:endParaRPr lang="en-US" sz="1200" b="1" dirty="0">
-              <a:latin typeface="+mn-lt"/>
-              <a:cs typeface="Arial" panose="020B0604020202020204" pitchFamily="34" charset="0"/>
-            </a:endParaRPr>
-          </a:p>
-          <a:p>
-            <a:pPr algn="ctr"/>
-            <a:r>
-              <a:rPr lang="en-US" sz="1200" b="1" dirty="0">
-                <a:latin typeface="+mn-lt"/>
-                <a:cs typeface="Arial" panose="020B0604020202020204" pitchFamily="34" charset="0"/>
-              </a:rPr>
-              <a:t>Concise Text on Slides to Explain the Main Points</a:t>
-            </a:r>
-          </a:p>
-          <a:p>
             <a:endParaRPr lang="en-US" dirty="0"/>
           </a:p>
         </p:txBody>
@@ -1132,84 +898,6 @@
           <a:bodyPr/>
           <a:lstStyle/>
           <a:p>
-            <a:pPr algn="ctr"/>
-            <a:r>
-              <a:rPr lang="en-US" sz="1200" b="1" dirty="0">
-                <a:latin typeface="+mn-lt"/>
-                <a:cs typeface="Arial" panose="020B0604020202020204" pitchFamily="34" charset="0"/>
-              </a:rPr>
-              <a:t>Showcase Interesting and Innovative Aspects of Your Workflow.</a:t>
-            </a:r>
-          </a:p>
-          <a:p>
-            <a:pPr algn="ctr"/>
-            <a:endParaRPr lang="en-US" sz="1200" b="1" dirty="0">
-              <a:latin typeface="+mn-lt"/>
-              <a:cs typeface="Arial" panose="020B0604020202020204" pitchFamily="34" charset="0"/>
-            </a:endParaRPr>
-          </a:p>
-          <a:p>
-            <a:pPr algn="ctr"/>
-            <a:r>
-              <a:rPr lang="en-US" sz="1200" b="1" dirty="0">
-                <a:latin typeface="+mn-lt"/>
-                <a:cs typeface="Arial" panose="020B0604020202020204" pitchFamily="34" charset="0"/>
-              </a:rPr>
-              <a:t>State and Defend Modeling Decisions</a:t>
-            </a:r>
-          </a:p>
-          <a:p>
-            <a:pPr algn="ctr"/>
-            <a:endParaRPr lang="en-US" sz="1200" b="1" dirty="0">
-              <a:latin typeface="+mn-lt"/>
-              <a:cs typeface="Arial" panose="020B0604020202020204" pitchFamily="34" charset="0"/>
-            </a:endParaRPr>
-          </a:p>
-          <a:p>
-            <a:pPr algn="ctr"/>
-            <a:r>
-              <a:rPr lang="en-US" sz="1200" b="1" dirty="0">
-                <a:latin typeface="+mn-lt"/>
-                <a:cs typeface="Arial" panose="020B0604020202020204" pitchFamily="34" charset="0"/>
-              </a:rPr>
-              <a:t>Discuss Critical Results and Learnings for Workflow Steps</a:t>
-            </a:r>
-          </a:p>
-          <a:p>
-            <a:pPr algn="ctr"/>
-            <a:endParaRPr lang="en-US" sz="1200" b="1" dirty="0">
-              <a:latin typeface="+mn-lt"/>
-              <a:cs typeface="Arial" panose="020B0604020202020204" pitchFamily="34" charset="0"/>
-            </a:endParaRPr>
-          </a:p>
-          <a:p>
-            <a:pPr algn="ctr"/>
-            <a:r>
-              <a:rPr lang="en-US" sz="1200" b="1" dirty="0">
-                <a:latin typeface="+mn-lt"/>
-                <a:cs typeface="Arial" panose="020B0604020202020204" pitchFamily="34" charset="0"/>
-              </a:rPr>
-              <a:t>Captions for all Figures</a:t>
-            </a:r>
-          </a:p>
-          <a:p>
-            <a:pPr algn="ctr"/>
-            <a:endParaRPr lang="en-US" sz="1200" b="1" dirty="0">
-              <a:latin typeface="+mn-lt"/>
-              <a:cs typeface="Arial" panose="020B0604020202020204" pitchFamily="34" charset="0"/>
-            </a:endParaRPr>
-          </a:p>
-          <a:p>
-            <a:pPr algn="ctr"/>
-            <a:r>
-              <a:rPr lang="en-US" sz="1200" b="1" dirty="0">
-                <a:latin typeface="+mn-lt"/>
-                <a:cs typeface="Arial" panose="020B0604020202020204" pitchFamily="34" charset="0"/>
-              </a:rPr>
-              <a:t>Concise Text on Slides to Explain the Main Points</a:t>
-            </a:r>
-          </a:p>
-          <a:p>
             <a:endParaRPr lang="en-US" dirty="0"/>
           </a:p>
         </p:txBody>
@@ -1293,84 +981,6 @@
         <p:txBody>
           <a:bodyPr/>
           <a:lstStyle/>
-          <a:p>
-            <a:pPr algn="ctr"/>
-            <a:r>
-              <a:rPr lang="en-US" sz="1200" b="1" dirty="0">
-                <a:latin typeface="+mn-lt"/>
-                <a:cs typeface="Arial" panose="020B0604020202020204" pitchFamily="34" charset="0"/>
-              </a:rPr>
-              <a:t>Showcase Interesting and Innovative Aspects of Your Workflow.</a:t>
-            </a:r>
-          </a:p>
-          <a:p>
-            <a:pPr algn="ctr"/>
-            <a:endParaRPr lang="en-US" sz="1200" b="1" dirty="0">
-              <a:latin typeface="+mn-lt"/>
-              <a:cs typeface="Arial" panose="020B0604020202020204" pitchFamily="34" charset="0"/>
-            </a:endParaRPr>
-          </a:p>
-          <a:p>
-            <a:pPr algn="ctr"/>
-            <a:r>
-              <a:rPr lang="en-US" sz="1200" b="1" dirty="0">
-                <a:latin typeface="+mn-lt"/>
-                <a:cs typeface="Arial" panose="020B0604020202020204" pitchFamily="34" charset="0"/>
-              </a:rPr>
-              <a:t>State and Defend Modeling Decisions</a:t>
-            </a:r>
-          </a:p>
-          <a:p>
-            <a:pPr algn="ctr"/>
-            <a:endParaRPr lang="en-US" sz="1200" b="1" dirty="0">
-              <a:latin typeface="+mn-lt"/>
-              <a:cs typeface="Arial" panose="020B0604020202020204" pitchFamily="34" charset="0"/>
-            </a:endParaRPr>
-          </a:p>
-          <a:p>
-            <a:pPr algn="ctr"/>
-            <a:r>
-              <a:rPr lang="en-US" sz="1200" b="1" dirty="0">
-                <a:latin typeface="+mn-lt"/>
-                <a:cs typeface="Arial" panose="020B0604020202020204" pitchFamily="34" charset="0"/>
-              </a:rPr>
-              <a:t>Discuss Critical Results and Learnings for Workflow Steps</a:t>
-            </a:r>
-          </a:p>
-          <a:p>
-            <a:pPr algn="ctr"/>
-            <a:endParaRPr lang="en-US" sz="1200" b="1" dirty="0">
-              <a:latin typeface="+mn-lt"/>
-              <a:cs typeface="Arial" panose="020B0604020202020204" pitchFamily="34" charset="0"/>
-            </a:endParaRPr>
-          </a:p>
-          <a:p>
-            <a:pPr algn="ctr"/>
-            <a:r>
-              <a:rPr lang="en-US" sz="1200" b="1" dirty="0">
-                <a:latin typeface="+mn-lt"/>
-                <a:cs typeface="Arial" panose="020B0604020202020204" pitchFamily="34" charset="0"/>
-              </a:rPr>
-              <a:t>Captions for all Figures</a:t>
-            </a:r>
-          </a:p>
-          <a:p>
-            <a:pPr algn="ctr"/>
-            <a:endParaRPr lang="en-US" sz="1200" b="1" dirty="0">
-              <a:latin typeface="+mn-lt"/>
-              <a:cs typeface="Arial" panose="020B0604020202020204" pitchFamily="34" charset="0"/>
-            </a:endParaRPr>
-          </a:p>
-          <a:p>
-            <a:pPr algn="ctr"/>
-            <a:r>
-              <a:rPr lang="en-US" sz="1200" b="1" dirty="0">
-                <a:latin typeface="+mn-lt"/>
-                <a:cs typeface="Arial" panose="020B0604020202020204" pitchFamily="34" charset="0"/>
-              </a:rPr>
-              <a:t>Concise Text on Slides to Explain the Main Points</a:t>
-            </a:r>
-          </a:p>
           <a:p>
             <a:endParaRPr lang="en-US" dirty="0"/>
           </a:p>
@@ -1787,17 +1397,17 @@
           <a:noFill/>
           <a:extLst>
             <a:ext uri="{FAA26D3D-D897-4be2-8F04-BA451C77F1D7}">
-              <ma14:placeholderFlag xmlns="" xmlns:ma14="http://schemas.microsoft.com/office/mac/drawingml/2011/main" val="1"/>
+              <ma14:placeholderFlag xmlns:ma14="http://schemas.microsoft.com/office/mac/drawingml/2011/main" xmlns="" val="1"/>
             </a:ext>
             <a:ext uri="{909E8E84-426E-40dd-AFC4-6F175D3DCCD1}">
-              <a14:hiddenFill xmlns:a14="http://schemas.microsoft.com/office/drawing/2010/main" xmlns="">
+              <a14:hiddenFill xmlns="" xmlns:a14="http://schemas.microsoft.com/office/drawing/2010/main">
                 <a:solidFill>
                   <a:srgbClr val="FFFFFF"/>
                 </a:solidFill>
               </a14:hiddenFill>
             </a:ext>
             <a:ext uri="{91240B29-F687-4f45-9708-019B960494DF}">
-              <a14:hiddenLine xmlns:a14="http://schemas.microsoft.com/office/drawing/2010/main" xmlns="" w="9525">
+              <a14:hiddenLine xmlns="" xmlns:a14="http://schemas.microsoft.com/office/drawing/2010/main" w="9525">
                 <a:solidFill>
                   <a:srgbClr val="000000"/>
                 </a:solidFill>
@@ -1939,17 +1549,17 @@
           <a:noFill/>
           <a:extLst>
             <a:ext uri="{FAA26D3D-D897-4be2-8F04-BA451C77F1D7}">
-              <ma14:placeholderFlag xmlns="" xmlns:ma14="http://schemas.microsoft.com/office/mac/drawingml/2011/main" val="1"/>
+              <ma14:placeholderFlag xmlns:ma14="http://schemas.microsoft.com/office/mac/drawingml/2011/main" xmlns="" val="1"/>
             </a:ext>
             <a:ext uri="{909E8E84-426E-40dd-AFC4-6F175D3DCCD1}">
-              <a14:hiddenFill xmlns:a14="http://schemas.microsoft.com/office/drawing/2010/main" xmlns="">
+              <a14:hiddenFill xmlns="" xmlns:a14="http://schemas.microsoft.com/office/drawing/2010/main">
                 <a:solidFill>
                   <a:srgbClr val="FFFFFF"/>
                 </a:solidFill>
               </a14:hiddenFill>
             </a:ext>
             <a:ext uri="{91240B29-F687-4f45-9708-019B960494DF}">
-              <a14:hiddenLine xmlns:a14="http://schemas.microsoft.com/office/drawing/2010/main" xmlns="" w="9525">
+              <a14:hiddenLine xmlns="" xmlns:a14="http://schemas.microsoft.com/office/drawing/2010/main" w="9525">
                 <a:solidFill>
                   <a:srgbClr val="000000"/>
                 </a:solidFill>
@@ -2090,17 +1700,17 @@
           <a:noFill/>
           <a:extLst>
             <a:ext uri="{FAA26D3D-D897-4be2-8F04-BA451C77F1D7}">
-              <ma14:placeholderFlag xmlns="" xmlns:ma14="http://schemas.microsoft.com/office/mac/drawingml/2011/main" val="1"/>
+              <ma14:placeholderFlag xmlns:ma14="http://schemas.microsoft.com/office/mac/drawingml/2011/main" xmlns="" val="1"/>
             </a:ext>
             <a:ext uri="{909E8E84-426E-40dd-AFC4-6F175D3DCCD1}">
-              <a14:hiddenFill xmlns:a14="http://schemas.microsoft.com/office/drawing/2010/main" xmlns="">
+              <a14:hiddenFill xmlns="" xmlns:a14="http://schemas.microsoft.com/office/drawing/2010/main">
                 <a:solidFill>
                   <a:srgbClr val="FFFFFF"/>
                 </a:solidFill>
               </a14:hiddenFill>
             </a:ext>
             <a:ext uri="{91240B29-F687-4f45-9708-019B960494DF}">
-              <a14:hiddenLine xmlns:a14="http://schemas.microsoft.com/office/drawing/2010/main" xmlns="" w="9525">
+              <a14:hiddenLine xmlns="" xmlns:a14="http://schemas.microsoft.com/office/drawing/2010/main" w="9525">
                 <a:solidFill>
                   <a:srgbClr val="000000"/>
                 </a:solidFill>
@@ -2379,14 +1989,14 @@
           </a:ln>
           <a:extLst>
             <a:ext uri="{909E8E84-426E-40dd-AFC4-6F175D3DCCD1}">
-              <a14:hiddenFill xmlns:a14="http://schemas.microsoft.com/office/drawing/2010/main" xmlns="">
+              <a14:hiddenFill xmlns="" xmlns:a14="http://schemas.microsoft.com/office/drawing/2010/main">
                 <a:solidFill>
                   <a:srgbClr val="FFFFFF"/>
                 </a:solidFill>
               </a14:hiddenFill>
             </a:ext>
             <a:ext uri="{91240B29-F687-4f45-9708-019B960494DF}">
-              <a14:hiddenLine xmlns:a14="http://schemas.microsoft.com/office/drawing/2010/main" xmlns="" w="9525">
+              <a14:hiddenLine xmlns="" xmlns:a14="http://schemas.microsoft.com/office/drawing/2010/main" w="9525">
                 <a:solidFill>
                   <a:srgbClr val="000000"/>
                 </a:solidFill>
@@ -2449,17 +2059,17 @@
           <a:noFill/>
           <a:extLst>
             <a:ext uri="{FAA26D3D-D897-4be2-8F04-BA451C77F1D7}">
-              <ma14:placeholderFlag xmlns="" xmlns:ma14="http://schemas.microsoft.com/office/mac/drawingml/2011/main" val="1"/>
+              <ma14:placeholderFlag xmlns:ma14="http://schemas.microsoft.com/office/mac/drawingml/2011/main" xmlns="" val="1"/>
             </a:ext>
             <a:ext uri="{909E8E84-426E-40dd-AFC4-6F175D3DCCD1}">
-              <a14:hiddenFill xmlns:a14="http://schemas.microsoft.com/office/drawing/2010/main" xmlns="">
+              <a14:hiddenFill xmlns="" xmlns:a14="http://schemas.microsoft.com/office/drawing/2010/main">
                 <a:solidFill>
                   <a:srgbClr val="FFFFFF"/>
                 </a:solidFill>
               </a14:hiddenFill>
             </a:ext>
             <a:ext uri="{91240B29-F687-4f45-9708-019B960494DF}">
-              <a14:hiddenLine xmlns:a14="http://schemas.microsoft.com/office/drawing/2010/main" xmlns="" w="9525">
+              <a14:hiddenLine xmlns="" xmlns:a14="http://schemas.microsoft.com/office/drawing/2010/main" w="9525">
                 <a:solidFill>
                   <a:srgbClr val="000000"/>
                 </a:solidFill>
@@ -2600,17 +2210,17 @@
           <a:noFill/>
           <a:extLst>
             <a:ext uri="{FAA26D3D-D897-4be2-8F04-BA451C77F1D7}">
-              <ma14:placeholderFlag xmlns="" xmlns:ma14="http://schemas.microsoft.com/office/mac/drawingml/2011/main" val="1"/>
+              <ma14:placeholderFlag xmlns:ma14="http://schemas.microsoft.com/office/mac/drawingml/2011/main" xmlns="" val="1"/>
             </a:ext>
             <a:ext uri="{909E8E84-426E-40dd-AFC4-6F175D3DCCD1}">
-              <a14:hiddenFill xmlns:a14="http://schemas.microsoft.com/office/drawing/2010/main" xmlns="">
+              <a14:hiddenFill xmlns="" xmlns:a14="http://schemas.microsoft.com/office/drawing/2010/main">
                 <a:solidFill>
                   <a:srgbClr val="FFFFFF"/>
                 </a:solidFill>
               </a14:hiddenFill>
             </a:ext>
             <a:ext uri="{91240B29-F687-4f45-9708-019B960494DF}">
-              <a14:hiddenLine xmlns:a14="http://schemas.microsoft.com/office/drawing/2010/main" xmlns="" w="9525">
+              <a14:hiddenLine xmlns="" xmlns:a14="http://schemas.microsoft.com/office/drawing/2010/main" w="9525">
                 <a:solidFill>
                   <a:srgbClr val="000000"/>
                 </a:solidFill>
@@ -2782,17 +2392,17 @@
           <a:noFill/>
           <a:extLst>
             <a:ext uri="{FAA26D3D-D897-4be2-8F04-BA451C77F1D7}">
-              <ma14:placeholderFlag xmlns="" xmlns:ma14="http://schemas.microsoft.com/office/mac/drawingml/2011/main" val="1"/>
+              <ma14:placeholderFlag xmlns:ma14="http://schemas.microsoft.com/office/mac/drawingml/2011/main" xmlns="" val="1"/>
             </a:ext>
             <a:ext uri="{909E8E84-426E-40dd-AFC4-6F175D3DCCD1}">
-              <a14:hiddenFill xmlns:a14="http://schemas.microsoft.com/office/drawing/2010/main" xmlns="">
+              <a14:hiddenFill xmlns="" xmlns:a14="http://schemas.microsoft.com/office/drawing/2010/main">
                 <a:solidFill>
                   <a:srgbClr val="FFFFFF"/>
                 </a:solidFill>
               </a14:hiddenFill>
             </a:ext>
             <a:ext uri="{91240B29-F687-4f45-9708-019B960494DF}">
-              <a14:hiddenLine xmlns:a14="http://schemas.microsoft.com/office/drawing/2010/main" xmlns="" w="9525">
+              <a14:hiddenLine xmlns="" xmlns:a14="http://schemas.microsoft.com/office/drawing/2010/main" w="9525">
                 <a:solidFill>
                   <a:srgbClr val="000000"/>
                 </a:solidFill>
@@ -5321,6 +4931,164 @@
           </a:p>
         </p:txBody>
       </p:sp>
+      <p:pic>
+        <p:nvPicPr>
+          <p:cNvPr id="3" name="Picture 2">
+            <a:extLst>
+              <a:ext uri="{FF2B5EF4-FFF2-40B4-BE49-F238E27FC236}">
+                <a16:creationId xmlns:a16="http://schemas.microsoft.com/office/drawing/2014/main" id="{B3B82B6A-FC46-420C-A0F3-9F4BD6C5583C}"/>
+              </a:ext>
+            </a:extLst>
+          </p:cNvPr>
+          <p:cNvPicPr>
+            <a:picLocks noChangeAspect="1"/>
+          </p:cNvPicPr>
+          <p:nvPr/>
+        </p:nvPicPr>
+        <p:blipFill>
+          <a:blip r:embed="rId3"/>
+          <a:stretch>
+            <a:fillRect/>
+          </a:stretch>
+        </p:blipFill>
+        <p:spPr>
+          <a:xfrm>
+            <a:off x="506028" y="1196482"/>
+            <a:ext cx="7084476" cy="1833775"/>
+          </a:xfrm>
+          <a:prstGeom prst="rect">
+            <a:avLst/>
+          </a:prstGeom>
+        </p:spPr>
+      </p:pic>
+      <p:sp>
+        <p:nvSpPr>
+          <p:cNvPr id="4" name="TextBox 3">
+            <a:extLst>
+              <a:ext uri="{FF2B5EF4-FFF2-40B4-BE49-F238E27FC236}">
+                <a16:creationId xmlns:a16="http://schemas.microsoft.com/office/drawing/2014/main" id="{DF527846-2D46-4886-9C16-11138DA75D10}"/>
+              </a:ext>
+            </a:extLst>
+          </p:cNvPr>
+          <p:cNvSpPr txBox="1"/>
+          <p:nvPr/>
+        </p:nvSpPr>
+        <p:spPr>
+          <a:xfrm>
+            <a:off x="636614" y="2960791"/>
+            <a:ext cx="7870770" cy="707886"/>
+          </a:xfrm>
+          <a:prstGeom prst="rect">
+            <a:avLst/>
+          </a:prstGeom>
+          <a:noFill/>
+        </p:spPr>
+        <p:txBody>
+          <a:bodyPr wrap="square" rtlCol="0">
+            <a:spAutoFit/>
+          </a:bodyPr>
+          <a:lstStyle/>
+          <a:p>
+            <a:pPr marL="342900" indent="-342900">
+              <a:buFont typeface="Arial" panose="020B0604020202020204" pitchFamily="34" charset="0"/>
+              <a:buChar char="•"/>
+            </a:pPr>
+            <a:r>
+              <a:rPr lang="en-US" sz="2000" dirty="0"/>
+              <a:t>Permeability and Porosity are largely missing</a:t>
+            </a:r>
+          </a:p>
+          <a:p>
+            <a:pPr marL="342900" indent="-342900">
+              <a:buFont typeface="Arial" panose="020B0604020202020204" pitchFamily="34" charset="0"/>
+              <a:buChar char="•"/>
+            </a:pPr>
+            <a:r>
+              <a:rPr lang="en-US" sz="2000" dirty="0"/>
+              <a:t>DTS and DENC have lots of data missing as well</a:t>
+            </a:r>
+          </a:p>
+        </p:txBody>
+      </p:sp>
+      <p:pic>
+        <p:nvPicPr>
+          <p:cNvPr id="6" name="Picture 5" descr="A picture containing calendar&#10;&#10;Description automatically generated">
+            <a:extLst>
+              <a:ext uri="{FF2B5EF4-FFF2-40B4-BE49-F238E27FC236}">
+                <a16:creationId xmlns:a16="http://schemas.microsoft.com/office/drawing/2014/main" id="{483A708E-53AD-4287-92A1-FC47F16789ED}"/>
+              </a:ext>
+            </a:extLst>
+          </p:cNvPr>
+          <p:cNvPicPr>
+            <a:picLocks noChangeAspect="1"/>
+          </p:cNvPicPr>
+          <p:nvPr/>
+        </p:nvPicPr>
+        <p:blipFill>
+          <a:blip r:embed="rId4"/>
+          <a:stretch>
+            <a:fillRect/>
+          </a:stretch>
+        </p:blipFill>
+        <p:spPr>
+          <a:xfrm>
+            <a:off x="194115" y="4061294"/>
+            <a:ext cx="8716441" cy="1452740"/>
+          </a:xfrm>
+          <a:prstGeom prst="rect">
+            <a:avLst/>
+          </a:prstGeom>
+        </p:spPr>
+      </p:pic>
+      <p:sp>
+        <p:nvSpPr>
+          <p:cNvPr id="8" name="TextBox 7">
+            <a:extLst>
+              <a:ext uri="{FF2B5EF4-FFF2-40B4-BE49-F238E27FC236}">
+                <a16:creationId xmlns:a16="http://schemas.microsoft.com/office/drawing/2014/main" id="{FAE8851A-8460-4359-9D36-C3F65EDA778D}"/>
+              </a:ext>
+            </a:extLst>
+          </p:cNvPr>
+          <p:cNvSpPr txBox="1"/>
+          <p:nvPr/>
+        </p:nvSpPr>
+        <p:spPr>
+          <a:xfrm>
+            <a:off x="636614" y="5533698"/>
+            <a:ext cx="7870770" cy="707886"/>
+          </a:xfrm>
+          <a:prstGeom prst="rect">
+            <a:avLst/>
+          </a:prstGeom>
+          <a:noFill/>
+        </p:spPr>
+        <p:txBody>
+          <a:bodyPr wrap="square" rtlCol="0">
+            <a:spAutoFit/>
+          </a:bodyPr>
+          <a:lstStyle/>
+          <a:p>
+            <a:pPr marL="342900" indent="-342900">
+              <a:buFont typeface="Arial" panose="020B0604020202020204" pitchFamily="34" charset="0"/>
+              <a:buChar char="•"/>
+            </a:pPr>
+            <a:r>
+              <a:rPr lang="en-US" sz="2000" dirty="0"/>
+              <a:t>Data table made with mean values for all 50 wells</a:t>
+            </a:r>
+          </a:p>
+          <a:p>
+            <a:pPr marL="342900" indent="-342900">
+              <a:buFont typeface="Arial" panose="020B0604020202020204" pitchFamily="34" charset="0"/>
+              <a:buChar char="•"/>
+            </a:pPr>
+            <a:r>
+              <a:rPr lang="en-US" sz="2000" dirty="0"/>
+              <a:t>Production and location data were added to well logs</a:t>
+            </a:r>
+          </a:p>
+        </p:txBody>
+      </p:sp>
     </p:spTree>
     <p:extLst>
       <p:ext uri="{BB962C8B-B14F-4D97-AF65-F5344CB8AC3E}">
@@ -5365,7 +5133,7 @@
         </p:nvSpPr>
         <p:spPr>
           <a:xfrm>
-            <a:off x="506027" y="857928"/>
+            <a:off x="506027" y="926754"/>
             <a:ext cx="8043169" cy="677108"/>
           </a:xfrm>
           <a:prstGeom prst="rect">
@@ -5394,6 +5162,122 @@
               <a:latin typeface="+mn-lt"/>
               <a:cs typeface="Arial" panose="020B0604020202020204" pitchFamily="34" charset="0"/>
             </a:endParaRPr>
+          </a:p>
+        </p:txBody>
+      </p:sp>
+      <p:pic>
+        <p:nvPicPr>
+          <p:cNvPr id="5" name="Picture 4" descr="Background pattern&#10;&#10;Description automatically generated">
+            <a:extLst>
+              <a:ext uri="{FF2B5EF4-FFF2-40B4-BE49-F238E27FC236}">
+                <a16:creationId xmlns:a16="http://schemas.microsoft.com/office/drawing/2014/main" id="{7351D24B-B82B-4396-8E09-4720353FEC41}"/>
+              </a:ext>
+            </a:extLst>
+          </p:cNvPr>
+          <p:cNvPicPr>
+            <a:picLocks noChangeAspect="1"/>
+          </p:cNvPicPr>
+          <p:nvPr/>
+        </p:nvPicPr>
+        <p:blipFill>
+          <a:blip r:embed="rId3"/>
+          <a:stretch>
+            <a:fillRect/>
+          </a:stretch>
+        </p:blipFill>
+        <p:spPr>
+          <a:xfrm>
+            <a:off x="103185" y="1603862"/>
+            <a:ext cx="5452041" cy="4540517"/>
+          </a:xfrm>
+          <a:prstGeom prst="rect">
+            <a:avLst/>
+          </a:prstGeom>
+        </p:spPr>
+      </p:pic>
+      <p:sp>
+        <p:nvSpPr>
+          <p:cNvPr id="6" name="TextBox 5">
+            <a:extLst>
+              <a:ext uri="{FF2B5EF4-FFF2-40B4-BE49-F238E27FC236}">
+                <a16:creationId xmlns:a16="http://schemas.microsoft.com/office/drawing/2014/main" id="{07446857-0F23-41AE-8ECB-F996F22C27B6}"/>
+              </a:ext>
+            </a:extLst>
+          </p:cNvPr>
+          <p:cNvSpPr txBox="1"/>
+          <p:nvPr/>
+        </p:nvSpPr>
+        <p:spPr>
+          <a:xfrm>
+            <a:off x="5702710" y="1603862"/>
+            <a:ext cx="3249328" cy="4524315"/>
+          </a:xfrm>
+          <a:prstGeom prst="rect">
+            <a:avLst/>
+          </a:prstGeom>
+          <a:noFill/>
+        </p:spPr>
+        <p:txBody>
+          <a:bodyPr wrap="square" rtlCol="0">
+            <a:spAutoFit/>
+          </a:bodyPr>
+          <a:lstStyle/>
+          <a:p>
+            <a:pPr marL="342900" indent="-342900">
+              <a:buFont typeface="Arial" panose="020B0604020202020204" pitchFamily="34" charset="0"/>
+              <a:buChar char="•"/>
+            </a:pPr>
+            <a:r>
+              <a:rPr lang="en-US" dirty="0"/>
+              <a:t>Looked for features with high correlation to production</a:t>
+            </a:r>
+          </a:p>
+          <a:p>
+            <a:pPr marL="342900" indent="-342900">
+              <a:buFont typeface="Arial" panose="020B0604020202020204" pitchFamily="34" charset="0"/>
+              <a:buChar char="•"/>
+            </a:pPr>
+            <a:r>
+              <a:rPr lang="en-US" dirty="0"/>
+              <a:t>Features with lots of NaN values were ignored</a:t>
+            </a:r>
+          </a:p>
+          <a:p>
+            <a:pPr marL="800100" lvl="1" indent="-342900">
+              <a:buFont typeface="Arial" panose="020B0604020202020204" pitchFamily="34" charset="0"/>
+              <a:buChar char="•"/>
+            </a:pPr>
+            <a:r>
+              <a:rPr lang="en-US" dirty="0"/>
+              <a:t>Porosity, Permeability</a:t>
+            </a:r>
+          </a:p>
+          <a:p>
+            <a:pPr marL="342900" indent="-342900">
+              <a:buFont typeface="Arial" panose="020B0604020202020204" pitchFamily="34" charset="0"/>
+              <a:buChar char="•"/>
+            </a:pPr>
+            <a:r>
+              <a:rPr lang="en-US" dirty="0"/>
+              <a:t>Some features were redundant</a:t>
+            </a:r>
+          </a:p>
+          <a:p>
+            <a:pPr marL="800100" lvl="1" indent="-342900">
+              <a:buFont typeface="Arial" panose="020B0604020202020204" pitchFamily="34" charset="0"/>
+              <a:buChar char="•"/>
+            </a:pPr>
+            <a:r>
+              <a:rPr lang="en-US" dirty="0"/>
+              <a:t>RHOB and DENC</a:t>
+            </a:r>
+          </a:p>
+          <a:p>
+            <a:pPr marL="342900" indent="-342900">
+              <a:buFont typeface="Arial" panose="020B0604020202020204" pitchFamily="34" charset="0"/>
+              <a:buChar char="•"/>
+            </a:pPr>
+            <a:endParaRPr lang="en-US" dirty="0"/>
           </a:p>
         </p:txBody>
       </p:sp>

</xml_diff>